<commit_message>
Weitere Bilder, Fehler behoben
</commit_message>
<xml_diff>
--- a/Praesentation/FMSynthese-Matze.pptx
+++ b/Praesentation/FMSynthese-Matze.pptx
@@ -6332,6 +6332,54 @@
       </p:grpSpPr>
       <p:sp>
         <p:nvSpPr>
+          <p:cNvPr id="20" name="Pfeil nach unten 19"/>
+          <p:cNvSpPr/>
+          <p:nvPr/>
+        </p:nvSpPr>
+        <p:spPr>
+          <a:xfrm rot="19285559">
+            <a:off x="5842403" y="3308805"/>
+            <a:ext cx="484632" cy="1323423"/>
+          </a:xfrm>
+          <a:prstGeom prst="downArrow">
+            <a:avLst/>
+          </a:prstGeom>
+          <a:solidFill>
+            <a:schemeClr val="accent1"/>
+          </a:solidFill>
+          <a:ln>
+            <a:solidFill>
+              <a:schemeClr val="accent1"/>
+            </a:solidFill>
+          </a:ln>
+        </p:spPr>
+        <p:style>
+          <a:lnRef idx="2">
+            <a:schemeClr val="accent1">
+              <a:shade val="50000"/>
+            </a:schemeClr>
+          </a:lnRef>
+          <a:fillRef idx="1">
+            <a:schemeClr val="accent1"/>
+          </a:fillRef>
+          <a:effectRef idx="0">
+            <a:schemeClr val="accent1"/>
+          </a:effectRef>
+          <a:fontRef idx="minor">
+            <a:schemeClr val="lt1"/>
+          </a:fontRef>
+        </p:style>
+        <p:txBody>
+          <a:bodyPr rtlCol="0" anchor="ctr"/>
+          <a:lstStyle/>
+          <a:p>
+            <a:pPr algn="ctr"/>
+            <a:endParaRPr lang="de-DE"/>
+          </a:p>
+        </p:txBody>
+      </p:sp>
+      <p:sp>
+        <p:nvSpPr>
           <p:cNvPr id="2" name="Titel 1"/>
           <p:cNvSpPr>
             <a:spLocks noGrp="1"/>
@@ -7048,6 +7096,203 @@
               <a:t>Pro Träger-Modulator-Paar gilt:</a:t>
             </a:r>
             <a:endParaRPr lang="de-DE" dirty="0"/>
+          </a:p>
+        </p:txBody>
+      </p:sp>
+      <p:sp>
+        <p:nvSpPr>
+          <p:cNvPr id="19" name="Rechteck 18"/>
+          <p:cNvSpPr/>
+          <p:nvPr/>
+        </p:nvSpPr>
+        <p:spPr>
+          <a:xfrm>
+            <a:off x="5076057" y="2699657"/>
+            <a:ext cx="864096" cy="864096"/>
+          </a:xfrm>
+          <a:prstGeom prst="rect">
+            <a:avLst/>
+          </a:prstGeom>
+          <a:ln>
+            <a:solidFill>
+              <a:schemeClr val="accent1"/>
+            </a:solidFill>
+          </a:ln>
+        </p:spPr>
+        <p:style>
+          <a:lnRef idx="2">
+            <a:schemeClr val="accent1">
+              <a:shade val="50000"/>
+            </a:schemeClr>
+          </a:lnRef>
+          <a:fillRef idx="1">
+            <a:schemeClr val="accent1"/>
+          </a:fillRef>
+          <a:effectRef idx="0">
+            <a:schemeClr val="accent1"/>
+          </a:effectRef>
+          <a:fontRef idx="minor">
+            <a:schemeClr val="lt1"/>
+          </a:fontRef>
+        </p:style>
+        <p:txBody>
+          <a:bodyPr rtlCol="0" anchor="ctr"/>
+          <a:lstStyle/>
+          <a:p>
+            <a:pPr algn="ctr"/>
+            <a:r>
+              <a:rPr lang="de-DE" sz="3000" dirty="0" smtClean="0">
+                <a:ln w="0"/>
+                <a:solidFill>
+                  <a:schemeClr val="tx1"/>
+                </a:solidFill>
+                <a:effectLst>
+                  <a:outerShdw blurRad="38100" dist="19050" dir="2700000" algn="tl" rotWithShape="0">
+                    <a:schemeClr val="dk1">
+                      <a:alpha val="40000"/>
+                    </a:schemeClr>
+                  </a:outerShdw>
+                </a:effectLst>
+              </a:rPr>
+              <a:t>T1</a:t>
+            </a:r>
+            <a:endParaRPr lang="de-DE" sz="3000" dirty="0">
+              <a:ln w="0"/>
+              <a:solidFill>
+                <a:schemeClr val="tx1"/>
+              </a:solidFill>
+              <a:effectLst>
+                <a:outerShdw blurRad="38100" dist="19050" dir="2700000" algn="tl" rotWithShape="0">
+                  <a:schemeClr val="dk1">
+                    <a:alpha val="40000"/>
+                  </a:schemeClr>
+                </a:outerShdw>
+              </a:effectLst>
+            </a:endParaRPr>
+          </a:p>
+        </p:txBody>
+      </p:sp>
+      <p:sp>
+        <p:nvSpPr>
+          <p:cNvPr id="21" name="Pfeil nach unten 20"/>
+          <p:cNvSpPr/>
+          <p:nvPr/>
+        </p:nvSpPr>
+        <p:spPr>
+          <a:xfrm>
+            <a:off x="5265789" y="1910585"/>
+            <a:ext cx="484632" cy="978408"/>
+          </a:xfrm>
+          <a:prstGeom prst="downArrow">
+            <a:avLst/>
+          </a:prstGeom>
+          <a:solidFill>
+            <a:schemeClr val="accent2"/>
+          </a:solidFill>
+          <a:ln>
+            <a:solidFill>
+              <a:schemeClr val="accent2"/>
+            </a:solidFill>
+          </a:ln>
+        </p:spPr>
+        <p:style>
+          <a:lnRef idx="2">
+            <a:schemeClr val="accent1">
+              <a:shade val="50000"/>
+            </a:schemeClr>
+          </a:lnRef>
+          <a:fillRef idx="1">
+            <a:schemeClr val="accent1"/>
+          </a:fillRef>
+          <a:effectRef idx="0">
+            <a:schemeClr val="accent1"/>
+          </a:effectRef>
+          <a:fontRef idx="minor">
+            <a:schemeClr val="lt1"/>
+          </a:fontRef>
+        </p:style>
+        <p:txBody>
+          <a:bodyPr rtlCol="0" anchor="ctr"/>
+          <a:lstStyle/>
+          <a:p>
+            <a:pPr algn="ctr"/>
+            <a:endParaRPr lang="de-DE"/>
+          </a:p>
+        </p:txBody>
+      </p:sp>
+      <p:sp>
+        <p:nvSpPr>
+          <p:cNvPr id="22" name="Rechteck 21"/>
+          <p:cNvSpPr/>
+          <p:nvPr/>
+        </p:nvSpPr>
+        <p:spPr>
+          <a:xfrm>
+            <a:off x="5076057" y="1347615"/>
+            <a:ext cx="864096" cy="864096"/>
+          </a:xfrm>
+          <a:prstGeom prst="rect">
+            <a:avLst/>
+          </a:prstGeom>
+          <a:solidFill>
+            <a:schemeClr val="accent2"/>
+          </a:solidFill>
+          <a:ln>
+            <a:solidFill>
+              <a:schemeClr val="accent2"/>
+            </a:solidFill>
+          </a:ln>
+        </p:spPr>
+        <p:style>
+          <a:lnRef idx="2">
+            <a:schemeClr val="accent1">
+              <a:shade val="50000"/>
+            </a:schemeClr>
+          </a:lnRef>
+          <a:fillRef idx="1">
+            <a:schemeClr val="accent1"/>
+          </a:fillRef>
+          <a:effectRef idx="0">
+            <a:schemeClr val="accent1"/>
+          </a:effectRef>
+          <a:fontRef idx="minor">
+            <a:schemeClr val="lt1"/>
+          </a:fontRef>
+        </p:style>
+        <p:txBody>
+          <a:bodyPr rtlCol="0" anchor="ctr"/>
+          <a:lstStyle/>
+          <a:p>
+            <a:pPr algn="ctr"/>
+            <a:r>
+              <a:rPr lang="de-DE" sz="3000" dirty="0" smtClean="0">
+                <a:ln w="0"/>
+                <a:solidFill>
+                  <a:schemeClr val="tx1"/>
+                </a:solidFill>
+                <a:effectLst>
+                  <a:outerShdw blurRad="38100" dist="19050" dir="2700000" algn="tl" rotWithShape="0">
+                    <a:schemeClr val="dk1">
+                      <a:alpha val="40000"/>
+                    </a:schemeClr>
+                  </a:outerShdw>
+                </a:effectLst>
+              </a:rPr>
+              <a:t>M1</a:t>
+            </a:r>
+            <a:endParaRPr lang="de-DE" sz="3000" dirty="0">
+              <a:ln w="0"/>
+              <a:solidFill>
+                <a:schemeClr val="tx1"/>
+              </a:solidFill>
+              <a:effectLst>
+                <a:outerShdw blurRad="38100" dist="19050" dir="2700000" algn="tl" rotWithShape="0">
+                  <a:schemeClr val="dk1">
+                    <a:alpha val="40000"/>
+                  </a:schemeClr>
+                </a:outerShdw>
+              </a:effectLst>
+            </a:endParaRPr>
           </a:p>
         </p:txBody>
       </p:sp>

</xml_diff>